<commit_message>
Adding the line graph( long term) and short term graphs ( comparing 5 different params like miss distance, velocity, radius, magnitude, hazardous nature)
</commit_message>
<xml_diff>
--- a/Documentation/Docs/NASA Asteroids DA.pptx
+++ b/Documentation/Docs/NASA Asteroids DA.pptx
@@ -209,7 +209,7 @@
             <a:fld id="{E6451CCE-4B62-4B72-8EEC-B8EB48556317}" type="datetimeFigureOut">
               <a:rPr lang="en-US" smtClean="0"/>
               <a:pPr/>
-              <a:t>4/1/2019</a:t>
+              <a:t>4/2/2019</a:t>
             </a:fld>
             <a:endParaRPr lang="en-IN"/>
           </a:p>
@@ -1516,6 +1516,20 @@
           </a:bodyPr>
           <a:lstStyle/>
           <a:p>
+            <a:r>
+              <a:rPr lang="en-IN" baseline="0" dirty="0" smtClean="0"/>
+              <a:t>Main goal was to the visualize the </a:t>
+            </a:r>
+            <a:r>
+              <a:rPr lang="en-IN" baseline="0" dirty="0" err="1" smtClean="0"/>
+              <a:t>json</a:t>
+            </a:r>
+            <a:r>
+              <a:rPr lang="en-IN" baseline="0" dirty="0" smtClean="0"/>
+              <a:t> data values in a good format </a:t>
+            </a:r>
+          </a:p>
+          <a:p>
             <a:endParaRPr lang="en-IN" baseline="0" dirty="0" smtClean="0"/>
           </a:p>
         </p:txBody>
@@ -1898,7 +1912,7 @@
             <a:fld id="{25DDA433-6589-46AD-8D05-9E1E5CD5C5AC}" type="datetimeFigureOut">
               <a:rPr lang="en-US" smtClean="0"/>
               <a:pPr/>
-              <a:t>4/1/2019</a:t>
+              <a:t>4/2/2019</a:t>
             </a:fld>
             <a:endParaRPr lang="en-IN"/>
           </a:p>
@@ -2070,7 +2084,7 @@
             <a:fld id="{25DDA433-6589-46AD-8D05-9E1E5CD5C5AC}" type="datetimeFigureOut">
               <a:rPr lang="en-US" smtClean="0"/>
               <a:pPr/>
-              <a:t>4/1/2019</a:t>
+              <a:t>4/2/2019</a:t>
             </a:fld>
             <a:endParaRPr lang="en-IN"/>
           </a:p>
@@ -2252,7 +2266,7 @@
             <a:fld id="{25DDA433-6589-46AD-8D05-9E1E5CD5C5AC}" type="datetimeFigureOut">
               <a:rPr lang="en-US" smtClean="0"/>
               <a:pPr/>
-              <a:t>4/1/2019</a:t>
+              <a:t>4/2/2019</a:t>
             </a:fld>
             <a:endParaRPr lang="en-IN"/>
           </a:p>
@@ -2372,7 +2386,7 @@
             <a:fld id="{25DDA433-6589-46AD-8D05-9E1E5CD5C5AC}" type="datetimeFigureOut">
               <a:rPr lang="en-US" smtClean="0"/>
               <a:pPr/>
-              <a:t>4/1/2019</a:t>
+              <a:t>4/2/2019</a:t>
             </a:fld>
             <a:endParaRPr lang="en-IN"/>
           </a:p>
@@ -2492,7 +2506,7 @@
             <a:fld id="{25DDA433-6589-46AD-8D05-9E1E5CD5C5AC}" type="datetimeFigureOut">
               <a:rPr lang="en-US" smtClean="0"/>
               <a:pPr/>
-              <a:t>4/1/2019</a:t>
+              <a:t>4/2/2019</a:t>
             </a:fld>
             <a:endParaRPr lang="en-IN"/>
           </a:p>
@@ -2736,7 +2750,7 @@
             <a:fld id="{DD2A2399-3C9C-6B45-A20A-3D6766199C84}" type="datetimeFigureOut">
               <a:rPr lang="en-US" smtClean="0"/>
               <a:pPr/>
-              <a:t>4/1/2019</a:t>
+              <a:t>4/2/2019</a:t>
             </a:fld>
             <a:endParaRPr lang="en-US"/>
           </a:p>
@@ -2908,7 +2922,7 @@
             <a:fld id="{DD2A2399-3C9C-6B45-A20A-3D6766199C84}" type="datetimeFigureOut">
               <a:rPr lang="en-US" smtClean="0"/>
               <a:pPr/>
-              <a:t>4/1/2019</a:t>
+              <a:t>4/2/2019</a:t>
             </a:fld>
             <a:endParaRPr lang="en-US"/>
           </a:p>
@@ -3156,7 +3170,7 @@
             <a:fld id="{DD2A2399-3C9C-6B45-A20A-3D6766199C84}" type="datetimeFigureOut">
               <a:rPr lang="en-US" smtClean="0"/>
               <a:pPr/>
-              <a:t>4/1/2019</a:t>
+              <a:t>4/2/2019</a:t>
             </a:fld>
             <a:endParaRPr lang="en-US"/>
           </a:p>
@@ -3446,7 +3460,7 @@
             <a:fld id="{DD2A2399-3C9C-6B45-A20A-3D6766199C84}" type="datetimeFigureOut">
               <a:rPr lang="en-US" smtClean="0"/>
               <a:pPr/>
-              <a:t>4/1/2019</a:t>
+              <a:t>4/2/2019</a:t>
             </a:fld>
             <a:endParaRPr lang="en-US"/>
           </a:p>
@@ -3870,7 +3884,7 @@
             <a:fld id="{DD2A2399-3C9C-6B45-A20A-3D6766199C84}" type="datetimeFigureOut">
               <a:rPr lang="en-US" smtClean="0"/>
               <a:pPr/>
-              <a:t>4/1/2019</a:t>
+              <a:t>4/2/2019</a:t>
             </a:fld>
             <a:endParaRPr lang="en-US"/>
           </a:p>
@@ -3990,7 +4004,7 @@
             <a:fld id="{DD2A2399-3C9C-6B45-A20A-3D6766199C84}" type="datetimeFigureOut">
               <a:rPr lang="en-US" smtClean="0"/>
               <a:pPr/>
-              <a:t>4/1/2019</a:t>
+              <a:t>4/2/2019</a:t>
             </a:fld>
             <a:endParaRPr lang="en-US"/>
           </a:p>
@@ -4162,7 +4176,7 @@
             <a:fld id="{25DDA433-6589-46AD-8D05-9E1E5CD5C5AC}" type="datetimeFigureOut">
               <a:rPr lang="en-US" smtClean="0"/>
               <a:pPr/>
-              <a:t>4/1/2019</a:t>
+              <a:t>4/2/2019</a:t>
             </a:fld>
             <a:endParaRPr lang="en-IN"/>
           </a:p>
@@ -4259,7 +4273,7 @@
             <a:fld id="{DD2A2399-3C9C-6B45-A20A-3D6766199C84}" type="datetimeFigureOut">
               <a:rPr lang="en-US" smtClean="0"/>
               <a:pPr/>
-              <a:t>4/1/2019</a:t>
+              <a:t>4/2/2019</a:t>
             </a:fld>
             <a:endParaRPr lang="en-US"/>
           </a:p>
@@ -4538,7 +4552,7 @@
             <a:fld id="{DD2A2399-3C9C-6B45-A20A-3D6766199C84}" type="datetimeFigureOut">
               <a:rPr lang="en-US" smtClean="0"/>
               <a:pPr/>
-              <a:t>4/1/2019</a:t>
+              <a:t>4/2/2019</a:t>
             </a:fld>
             <a:endParaRPr lang="en-US"/>
           </a:p>
@@ -4797,7 +4811,7 @@
             <a:fld id="{DD2A2399-3C9C-6B45-A20A-3D6766199C84}" type="datetimeFigureOut">
               <a:rPr lang="en-US" smtClean="0"/>
               <a:pPr/>
-              <a:t>4/1/2019</a:t>
+              <a:t>4/2/2019</a:t>
             </a:fld>
             <a:endParaRPr lang="en-US"/>
           </a:p>
@@ -4969,7 +4983,7 @@
             <a:fld id="{DD2A2399-3C9C-6B45-A20A-3D6766199C84}" type="datetimeFigureOut">
               <a:rPr lang="en-US" smtClean="0"/>
               <a:pPr/>
-              <a:t>4/1/2019</a:t>
+              <a:t>4/2/2019</a:t>
             </a:fld>
             <a:endParaRPr lang="en-US"/>
           </a:p>
@@ -5151,7 +5165,7 @@
             <a:fld id="{DD2A2399-3C9C-6B45-A20A-3D6766199C84}" type="datetimeFigureOut">
               <a:rPr lang="en-US" smtClean="0"/>
               <a:pPr/>
-              <a:t>4/1/2019</a:t>
+              <a:t>4/2/2019</a:t>
             </a:fld>
             <a:endParaRPr lang="en-US"/>
           </a:p>
@@ -5399,7 +5413,7 @@
             <a:fld id="{25DDA433-6589-46AD-8D05-9E1E5CD5C5AC}" type="datetimeFigureOut">
               <a:rPr lang="en-US" smtClean="0"/>
               <a:pPr/>
-              <a:t>4/1/2019</a:t>
+              <a:t>4/2/2019</a:t>
             </a:fld>
             <a:endParaRPr lang="en-IN"/>
           </a:p>
@@ -5689,7 +5703,7 @@
             <a:fld id="{25DDA433-6589-46AD-8D05-9E1E5CD5C5AC}" type="datetimeFigureOut">
               <a:rPr lang="en-US" smtClean="0"/>
               <a:pPr/>
-              <a:t>4/1/2019</a:t>
+              <a:t>4/2/2019</a:t>
             </a:fld>
             <a:endParaRPr lang="en-IN"/>
           </a:p>
@@ -6113,7 +6127,7 @@
             <a:fld id="{25DDA433-6589-46AD-8D05-9E1E5CD5C5AC}" type="datetimeFigureOut">
               <a:rPr lang="en-US" smtClean="0"/>
               <a:pPr/>
-              <a:t>4/1/2019</a:t>
+              <a:t>4/2/2019</a:t>
             </a:fld>
             <a:endParaRPr lang="en-IN"/>
           </a:p>
@@ -6233,7 +6247,7 @@
             <a:fld id="{25DDA433-6589-46AD-8D05-9E1E5CD5C5AC}" type="datetimeFigureOut">
               <a:rPr lang="en-US" smtClean="0"/>
               <a:pPr/>
-              <a:t>4/1/2019</a:t>
+              <a:t>4/2/2019</a:t>
             </a:fld>
             <a:endParaRPr lang="en-IN"/>
           </a:p>
@@ -6330,7 +6344,7 @@
             <a:fld id="{25DDA433-6589-46AD-8D05-9E1E5CD5C5AC}" type="datetimeFigureOut">
               <a:rPr lang="en-US" smtClean="0"/>
               <a:pPr/>
-              <a:t>4/1/2019</a:t>
+              <a:t>4/2/2019</a:t>
             </a:fld>
             <a:endParaRPr lang="en-IN"/>
           </a:p>
@@ -6609,7 +6623,7 @@
             <a:fld id="{25DDA433-6589-46AD-8D05-9E1E5CD5C5AC}" type="datetimeFigureOut">
               <a:rPr lang="en-US" smtClean="0"/>
               <a:pPr/>
-              <a:t>4/1/2019</a:t>
+              <a:t>4/2/2019</a:t>
             </a:fld>
             <a:endParaRPr lang="en-IN"/>
           </a:p>
@@ -6868,7 +6882,7 @@
             <a:fld id="{25DDA433-6589-46AD-8D05-9E1E5CD5C5AC}" type="datetimeFigureOut">
               <a:rPr lang="en-US" smtClean="0"/>
               <a:pPr/>
-              <a:t>4/1/2019</a:t>
+              <a:t>4/2/2019</a:t>
             </a:fld>
             <a:endParaRPr lang="en-IN"/>
           </a:p>
@@ -7089,7 +7103,7 @@
             <a:fld id="{25DDA433-6589-46AD-8D05-9E1E5CD5C5AC}" type="datetimeFigureOut">
               <a:rPr lang="en-US" smtClean="0"/>
               <a:pPr/>
-              <a:t>4/1/2019</a:t>
+              <a:t>4/2/2019</a:t>
             </a:fld>
             <a:endParaRPr lang="en-IN"/>
           </a:p>
@@ -7609,7 +7623,7 @@
             <a:fld id="{DD2A2399-3C9C-6B45-A20A-3D6766199C84}" type="datetimeFigureOut">
               <a:rPr lang="en-US" smtClean="0"/>
               <a:pPr/>
-              <a:t>4/1/2019</a:t>
+              <a:t>4/2/2019</a:t>
             </a:fld>
             <a:endParaRPr lang="en-US"/>
           </a:p>
@@ -9695,7 +9709,7 @@
                 </a:solidFill>
                 <a:latin typeface="Calibri" pitchFamily="34" charset="0"/>
               </a:rPr>
-              <a:t>Gathering the real time fire data using NASA FIRMS API:</a:t>
+              <a:t>Gathering the real time asteroids data using NASA Neo API:</a:t>
             </a:r>
           </a:p>
           <a:p>

</xml_diff>

<commit_message>
Adding few dependencies for heroku deployment
</commit_message>
<xml_diff>
--- a/Documentation/Docs/NASA Asteroids DA.pptx
+++ b/Documentation/Docs/NASA Asteroids DA.pptx
@@ -209,7 +209,7 @@
             <a:fld id="{E6451CCE-4B62-4B72-8EEC-B8EB48556317}" type="datetimeFigureOut">
               <a:rPr lang="en-US" smtClean="0"/>
               <a:pPr/>
-              <a:t>4/2/2019</a:t>
+              <a:t>5/8/2019</a:t>
             </a:fld>
             <a:endParaRPr lang="en-IN"/>
           </a:p>
@@ -1912,7 +1912,7 @@
             <a:fld id="{25DDA433-6589-46AD-8D05-9E1E5CD5C5AC}" type="datetimeFigureOut">
               <a:rPr lang="en-US" smtClean="0"/>
               <a:pPr/>
-              <a:t>4/2/2019</a:t>
+              <a:t>5/8/2019</a:t>
             </a:fld>
             <a:endParaRPr lang="en-IN"/>
           </a:p>
@@ -1964,7 +1964,7 @@
     </p:spTree>
     <p:extLst>
       <p:ext uri="{BB962C8B-B14F-4D97-AF65-F5344CB8AC3E}">
-        <p14:creationId xmlns="" xmlns:p14="http://schemas.microsoft.com/office/powerpoint/2010/main" val="3349243496"/>
+        <p14:creationId xmlns:p14="http://schemas.microsoft.com/office/powerpoint/2010/main" xmlns="" val="3349243496"/>
       </p:ext>
     </p:extLst>
   </p:cSld>
@@ -2084,7 +2084,7 @@
             <a:fld id="{25DDA433-6589-46AD-8D05-9E1E5CD5C5AC}" type="datetimeFigureOut">
               <a:rPr lang="en-US" smtClean="0"/>
               <a:pPr/>
-              <a:t>4/2/2019</a:t>
+              <a:t>5/8/2019</a:t>
             </a:fld>
             <a:endParaRPr lang="en-IN"/>
           </a:p>
@@ -2136,7 +2136,7 @@
     </p:spTree>
     <p:extLst>
       <p:ext uri="{BB962C8B-B14F-4D97-AF65-F5344CB8AC3E}">
-        <p14:creationId xmlns="" xmlns:p14="http://schemas.microsoft.com/office/powerpoint/2010/main" val="2448751325"/>
+        <p14:creationId xmlns:p14="http://schemas.microsoft.com/office/powerpoint/2010/main" xmlns="" val="2448751325"/>
       </p:ext>
     </p:extLst>
   </p:cSld>
@@ -2266,7 +2266,7 @@
             <a:fld id="{25DDA433-6589-46AD-8D05-9E1E5CD5C5AC}" type="datetimeFigureOut">
               <a:rPr lang="en-US" smtClean="0"/>
               <a:pPr/>
-              <a:t>4/2/2019</a:t>
+              <a:t>5/8/2019</a:t>
             </a:fld>
             <a:endParaRPr lang="en-IN"/>
           </a:p>
@@ -2318,7 +2318,7 @@
     </p:spTree>
     <p:extLst>
       <p:ext uri="{BB962C8B-B14F-4D97-AF65-F5344CB8AC3E}">
-        <p14:creationId xmlns="" xmlns:p14="http://schemas.microsoft.com/office/powerpoint/2010/main" val="555771467"/>
+        <p14:creationId xmlns:p14="http://schemas.microsoft.com/office/powerpoint/2010/main" xmlns="" val="555771467"/>
       </p:ext>
     </p:extLst>
   </p:cSld>
@@ -2386,7 +2386,7 @@
             <a:fld id="{25DDA433-6589-46AD-8D05-9E1E5CD5C5AC}" type="datetimeFigureOut">
               <a:rPr lang="en-US" smtClean="0"/>
               <a:pPr/>
-              <a:t>4/2/2019</a:t>
+              <a:t>5/8/2019</a:t>
             </a:fld>
             <a:endParaRPr lang="en-IN"/>
           </a:p>
@@ -2438,7 +2438,7 @@
     </p:spTree>
     <p:extLst>
       <p:ext uri="{BB962C8B-B14F-4D97-AF65-F5344CB8AC3E}">
-        <p14:creationId xmlns="" xmlns:p14="http://schemas.microsoft.com/office/powerpoint/2010/main" val="334226599"/>
+        <p14:creationId xmlns:p14="http://schemas.microsoft.com/office/powerpoint/2010/main" xmlns="" val="334226599"/>
       </p:ext>
     </p:extLst>
   </p:cSld>
@@ -2506,7 +2506,7 @@
             <a:fld id="{25DDA433-6589-46AD-8D05-9E1E5CD5C5AC}" type="datetimeFigureOut">
               <a:rPr lang="en-US" smtClean="0"/>
               <a:pPr/>
-              <a:t>4/2/2019</a:t>
+              <a:t>5/8/2019</a:t>
             </a:fld>
             <a:endParaRPr lang="en-IN"/>
           </a:p>
@@ -2558,7 +2558,7 @@
     </p:spTree>
     <p:extLst>
       <p:ext uri="{BB962C8B-B14F-4D97-AF65-F5344CB8AC3E}">
-        <p14:creationId xmlns="" xmlns:p14="http://schemas.microsoft.com/office/powerpoint/2010/main" val="2569279595"/>
+        <p14:creationId xmlns:p14="http://schemas.microsoft.com/office/powerpoint/2010/main" xmlns="" val="2569279595"/>
       </p:ext>
     </p:extLst>
   </p:cSld>
@@ -2750,7 +2750,7 @@
             <a:fld id="{DD2A2399-3C9C-6B45-A20A-3D6766199C84}" type="datetimeFigureOut">
               <a:rPr lang="en-US" smtClean="0"/>
               <a:pPr/>
-              <a:t>4/2/2019</a:t>
+              <a:t>5/8/2019</a:t>
             </a:fld>
             <a:endParaRPr lang="en-US"/>
           </a:p>
@@ -2802,7 +2802,7 @@
     </p:spTree>
     <p:extLst>
       <p:ext uri="{BB962C8B-B14F-4D97-AF65-F5344CB8AC3E}">
-        <p14:creationId xmlns="" xmlns:p14="http://schemas.microsoft.com/office/powerpoint/2010/main" val="3848797844"/>
+        <p14:creationId xmlns:p14="http://schemas.microsoft.com/office/powerpoint/2010/main" xmlns="" val="3848797844"/>
       </p:ext>
     </p:extLst>
   </p:cSld>
@@ -2922,7 +2922,7 @@
             <a:fld id="{DD2A2399-3C9C-6B45-A20A-3D6766199C84}" type="datetimeFigureOut">
               <a:rPr lang="en-US" smtClean="0"/>
               <a:pPr/>
-              <a:t>4/2/2019</a:t>
+              <a:t>5/8/2019</a:t>
             </a:fld>
             <a:endParaRPr lang="en-US"/>
           </a:p>
@@ -2974,7 +2974,7 @@
     </p:spTree>
     <p:extLst>
       <p:ext uri="{BB962C8B-B14F-4D97-AF65-F5344CB8AC3E}">
-        <p14:creationId xmlns="" xmlns:p14="http://schemas.microsoft.com/office/powerpoint/2010/main" val="3540261912"/>
+        <p14:creationId xmlns:p14="http://schemas.microsoft.com/office/powerpoint/2010/main" xmlns="" val="3540261912"/>
       </p:ext>
     </p:extLst>
   </p:cSld>
@@ -3170,7 +3170,7 @@
             <a:fld id="{DD2A2399-3C9C-6B45-A20A-3D6766199C84}" type="datetimeFigureOut">
               <a:rPr lang="en-US" smtClean="0"/>
               <a:pPr/>
-              <a:t>4/2/2019</a:t>
+              <a:t>5/8/2019</a:t>
             </a:fld>
             <a:endParaRPr lang="en-US"/>
           </a:p>
@@ -3222,7 +3222,7 @@
     </p:spTree>
     <p:extLst>
       <p:ext uri="{BB962C8B-B14F-4D97-AF65-F5344CB8AC3E}">
-        <p14:creationId xmlns="" xmlns:p14="http://schemas.microsoft.com/office/powerpoint/2010/main" val="269919408"/>
+        <p14:creationId xmlns:p14="http://schemas.microsoft.com/office/powerpoint/2010/main" xmlns="" val="269919408"/>
       </p:ext>
     </p:extLst>
   </p:cSld>
@@ -3460,7 +3460,7 @@
             <a:fld id="{DD2A2399-3C9C-6B45-A20A-3D6766199C84}" type="datetimeFigureOut">
               <a:rPr lang="en-US" smtClean="0"/>
               <a:pPr/>
-              <a:t>4/2/2019</a:t>
+              <a:t>5/8/2019</a:t>
             </a:fld>
             <a:endParaRPr lang="en-US"/>
           </a:p>
@@ -3512,7 +3512,7 @@
     </p:spTree>
     <p:extLst>
       <p:ext uri="{BB962C8B-B14F-4D97-AF65-F5344CB8AC3E}">
-        <p14:creationId xmlns="" xmlns:p14="http://schemas.microsoft.com/office/powerpoint/2010/main" val="2948329173"/>
+        <p14:creationId xmlns:p14="http://schemas.microsoft.com/office/powerpoint/2010/main" xmlns="" val="2948329173"/>
       </p:ext>
     </p:extLst>
   </p:cSld>
@@ -3884,7 +3884,7 @@
             <a:fld id="{DD2A2399-3C9C-6B45-A20A-3D6766199C84}" type="datetimeFigureOut">
               <a:rPr lang="en-US" smtClean="0"/>
               <a:pPr/>
-              <a:t>4/2/2019</a:t>
+              <a:t>5/8/2019</a:t>
             </a:fld>
             <a:endParaRPr lang="en-US"/>
           </a:p>
@@ -3936,7 +3936,7 @@
     </p:spTree>
     <p:extLst>
       <p:ext uri="{BB962C8B-B14F-4D97-AF65-F5344CB8AC3E}">
-        <p14:creationId xmlns="" xmlns:p14="http://schemas.microsoft.com/office/powerpoint/2010/main" val="1981233940"/>
+        <p14:creationId xmlns:p14="http://schemas.microsoft.com/office/powerpoint/2010/main" xmlns="" val="1981233940"/>
       </p:ext>
     </p:extLst>
   </p:cSld>
@@ -4004,7 +4004,7 @@
             <a:fld id="{DD2A2399-3C9C-6B45-A20A-3D6766199C84}" type="datetimeFigureOut">
               <a:rPr lang="en-US" smtClean="0"/>
               <a:pPr/>
-              <a:t>4/2/2019</a:t>
+              <a:t>5/8/2019</a:t>
             </a:fld>
             <a:endParaRPr lang="en-US"/>
           </a:p>
@@ -4056,7 +4056,7 @@
     </p:spTree>
     <p:extLst>
       <p:ext uri="{BB962C8B-B14F-4D97-AF65-F5344CB8AC3E}">
-        <p14:creationId xmlns="" xmlns:p14="http://schemas.microsoft.com/office/powerpoint/2010/main" val="1945381682"/>
+        <p14:creationId xmlns:p14="http://schemas.microsoft.com/office/powerpoint/2010/main" xmlns="" val="1945381682"/>
       </p:ext>
     </p:extLst>
   </p:cSld>
@@ -4176,7 +4176,7 @@
             <a:fld id="{25DDA433-6589-46AD-8D05-9E1E5CD5C5AC}" type="datetimeFigureOut">
               <a:rPr lang="en-US" smtClean="0"/>
               <a:pPr/>
-              <a:t>4/2/2019</a:t>
+              <a:t>5/8/2019</a:t>
             </a:fld>
             <a:endParaRPr lang="en-IN"/>
           </a:p>
@@ -4228,7 +4228,7 @@
     </p:spTree>
     <p:extLst>
       <p:ext uri="{BB962C8B-B14F-4D97-AF65-F5344CB8AC3E}">
-        <p14:creationId xmlns="" xmlns:p14="http://schemas.microsoft.com/office/powerpoint/2010/main" val="2833533934"/>
+        <p14:creationId xmlns:p14="http://schemas.microsoft.com/office/powerpoint/2010/main" xmlns="" val="2833533934"/>
       </p:ext>
     </p:extLst>
   </p:cSld>
@@ -4273,7 +4273,7 @@
             <a:fld id="{DD2A2399-3C9C-6B45-A20A-3D6766199C84}" type="datetimeFigureOut">
               <a:rPr lang="en-US" smtClean="0"/>
               <a:pPr/>
-              <a:t>4/2/2019</a:t>
+              <a:t>5/8/2019</a:t>
             </a:fld>
             <a:endParaRPr lang="en-US"/>
           </a:p>
@@ -4325,7 +4325,7 @@
     </p:spTree>
     <p:extLst>
       <p:ext uri="{BB962C8B-B14F-4D97-AF65-F5344CB8AC3E}">
-        <p14:creationId xmlns="" xmlns:p14="http://schemas.microsoft.com/office/powerpoint/2010/main" val="1345171184"/>
+        <p14:creationId xmlns:p14="http://schemas.microsoft.com/office/powerpoint/2010/main" xmlns="" val="1345171184"/>
       </p:ext>
     </p:extLst>
   </p:cSld>
@@ -4552,7 +4552,7 @@
             <a:fld id="{DD2A2399-3C9C-6B45-A20A-3D6766199C84}" type="datetimeFigureOut">
               <a:rPr lang="en-US" smtClean="0"/>
               <a:pPr/>
-              <a:t>4/2/2019</a:t>
+              <a:t>5/8/2019</a:t>
             </a:fld>
             <a:endParaRPr lang="en-US"/>
           </a:p>
@@ -4604,7 +4604,7 @@
     </p:spTree>
     <p:extLst>
       <p:ext uri="{BB962C8B-B14F-4D97-AF65-F5344CB8AC3E}">
-        <p14:creationId xmlns="" xmlns:p14="http://schemas.microsoft.com/office/powerpoint/2010/main" val="2443860245"/>
+        <p14:creationId xmlns:p14="http://schemas.microsoft.com/office/powerpoint/2010/main" xmlns="" val="2443860245"/>
       </p:ext>
     </p:extLst>
   </p:cSld>
@@ -4811,7 +4811,7 @@
             <a:fld id="{DD2A2399-3C9C-6B45-A20A-3D6766199C84}" type="datetimeFigureOut">
               <a:rPr lang="en-US" smtClean="0"/>
               <a:pPr/>
-              <a:t>4/2/2019</a:t>
+              <a:t>5/8/2019</a:t>
             </a:fld>
             <a:endParaRPr lang="en-US"/>
           </a:p>
@@ -4863,7 +4863,7 @@
     </p:spTree>
     <p:extLst>
       <p:ext uri="{BB962C8B-B14F-4D97-AF65-F5344CB8AC3E}">
-        <p14:creationId xmlns="" xmlns:p14="http://schemas.microsoft.com/office/powerpoint/2010/main" val="3351373231"/>
+        <p14:creationId xmlns:p14="http://schemas.microsoft.com/office/powerpoint/2010/main" xmlns="" val="3351373231"/>
       </p:ext>
     </p:extLst>
   </p:cSld>
@@ -4983,7 +4983,7 @@
             <a:fld id="{DD2A2399-3C9C-6B45-A20A-3D6766199C84}" type="datetimeFigureOut">
               <a:rPr lang="en-US" smtClean="0"/>
               <a:pPr/>
-              <a:t>4/2/2019</a:t>
+              <a:t>5/8/2019</a:t>
             </a:fld>
             <a:endParaRPr lang="en-US"/>
           </a:p>
@@ -5035,7 +5035,7 @@
     </p:spTree>
     <p:extLst>
       <p:ext uri="{BB962C8B-B14F-4D97-AF65-F5344CB8AC3E}">
-        <p14:creationId xmlns="" xmlns:p14="http://schemas.microsoft.com/office/powerpoint/2010/main" val="3132454376"/>
+        <p14:creationId xmlns:p14="http://schemas.microsoft.com/office/powerpoint/2010/main" xmlns="" val="3132454376"/>
       </p:ext>
     </p:extLst>
   </p:cSld>
@@ -5165,7 +5165,7 @@
             <a:fld id="{DD2A2399-3C9C-6B45-A20A-3D6766199C84}" type="datetimeFigureOut">
               <a:rPr lang="en-US" smtClean="0"/>
               <a:pPr/>
-              <a:t>4/2/2019</a:t>
+              <a:t>5/8/2019</a:t>
             </a:fld>
             <a:endParaRPr lang="en-US"/>
           </a:p>
@@ -5217,7 +5217,7 @@
     </p:spTree>
     <p:extLst>
       <p:ext uri="{BB962C8B-B14F-4D97-AF65-F5344CB8AC3E}">
-        <p14:creationId xmlns="" xmlns:p14="http://schemas.microsoft.com/office/powerpoint/2010/main" val="1862231194"/>
+        <p14:creationId xmlns:p14="http://schemas.microsoft.com/office/powerpoint/2010/main" xmlns="" val="1862231194"/>
       </p:ext>
     </p:extLst>
   </p:cSld>
@@ -5413,7 +5413,7 @@
             <a:fld id="{25DDA433-6589-46AD-8D05-9E1E5CD5C5AC}" type="datetimeFigureOut">
               <a:rPr lang="en-US" smtClean="0"/>
               <a:pPr/>
-              <a:t>4/2/2019</a:t>
+              <a:t>5/8/2019</a:t>
             </a:fld>
             <a:endParaRPr lang="en-IN"/>
           </a:p>
@@ -5465,7 +5465,7 @@
     </p:spTree>
     <p:extLst>
       <p:ext uri="{BB962C8B-B14F-4D97-AF65-F5344CB8AC3E}">
-        <p14:creationId xmlns="" xmlns:p14="http://schemas.microsoft.com/office/powerpoint/2010/main" val="3164561242"/>
+        <p14:creationId xmlns:p14="http://schemas.microsoft.com/office/powerpoint/2010/main" xmlns="" val="3164561242"/>
       </p:ext>
     </p:extLst>
   </p:cSld>
@@ -5703,7 +5703,7 @@
             <a:fld id="{25DDA433-6589-46AD-8D05-9E1E5CD5C5AC}" type="datetimeFigureOut">
               <a:rPr lang="en-US" smtClean="0"/>
               <a:pPr/>
-              <a:t>4/2/2019</a:t>
+              <a:t>5/8/2019</a:t>
             </a:fld>
             <a:endParaRPr lang="en-IN"/>
           </a:p>
@@ -5755,7 +5755,7 @@
     </p:spTree>
     <p:extLst>
       <p:ext uri="{BB962C8B-B14F-4D97-AF65-F5344CB8AC3E}">
-        <p14:creationId xmlns="" xmlns:p14="http://schemas.microsoft.com/office/powerpoint/2010/main" val="1080863291"/>
+        <p14:creationId xmlns:p14="http://schemas.microsoft.com/office/powerpoint/2010/main" xmlns="" val="1080863291"/>
       </p:ext>
     </p:extLst>
   </p:cSld>
@@ -6127,7 +6127,7 @@
             <a:fld id="{25DDA433-6589-46AD-8D05-9E1E5CD5C5AC}" type="datetimeFigureOut">
               <a:rPr lang="en-US" smtClean="0"/>
               <a:pPr/>
-              <a:t>4/2/2019</a:t>
+              <a:t>5/8/2019</a:t>
             </a:fld>
             <a:endParaRPr lang="en-IN"/>
           </a:p>
@@ -6179,7 +6179,7 @@
     </p:spTree>
     <p:extLst>
       <p:ext uri="{BB962C8B-B14F-4D97-AF65-F5344CB8AC3E}">
-        <p14:creationId xmlns="" xmlns:p14="http://schemas.microsoft.com/office/powerpoint/2010/main" val="174218213"/>
+        <p14:creationId xmlns:p14="http://schemas.microsoft.com/office/powerpoint/2010/main" xmlns="" val="174218213"/>
       </p:ext>
     </p:extLst>
   </p:cSld>
@@ -6247,7 +6247,7 @@
             <a:fld id="{25DDA433-6589-46AD-8D05-9E1E5CD5C5AC}" type="datetimeFigureOut">
               <a:rPr lang="en-US" smtClean="0"/>
               <a:pPr/>
-              <a:t>4/2/2019</a:t>
+              <a:t>5/8/2019</a:t>
             </a:fld>
             <a:endParaRPr lang="en-IN"/>
           </a:p>
@@ -6299,7 +6299,7 @@
     </p:spTree>
     <p:extLst>
       <p:ext uri="{BB962C8B-B14F-4D97-AF65-F5344CB8AC3E}">
-        <p14:creationId xmlns="" xmlns:p14="http://schemas.microsoft.com/office/powerpoint/2010/main" val="199654813"/>
+        <p14:creationId xmlns:p14="http://schemas.microsoft.com/office/powerpoint/2010/main" xmlns="" val="199654813"/>
       </p:ext>
     </p:extLst>
   </p:cSld>
@@ -6344,7 +6344,7 @@
             <a:fld id="{25DDA433-6589-46AD-8D05-9E1E5CD5C5AC}" type="datetimeFigureOut">
               <a:rPr lang="en-US" smtClean="0"/>
               <a:pPr/>
-              <a:t>4/2/2019</a:t>
+              <a:t>5/8/2019</a:t>
             </a:fld>
             <a:endParaRPr lang="en-IN"/>
           </a:p>
@@ -6396,7 +6396,7 @@
     </p:spTree>
     <p:extLst>
       <p:ext uri="{BB962C8B-B14F-4D97-AF65-F5344CB8AC3E}">
-        <p14:creationId xmlns="" xmlns:p14="http://schemas.microsoft.com/office/powerpoint/2010/main" val="1150096181"/>
+        <p14:creationId xmlns:p14="http://schemas.microsoft.com/office/powerpoint/2010/main" xmlns="" val="1150096181"/>
       </p:ext>
     </p:extLst>
   </p:cSld>
@@ -6623,7 +6623,7 @@
             <a:fld id="{25DDA433-6589-46AD-8D05-9E1E5CD5C5AC}" type="datetimeFigureOut">
               <a:rPr lang="en-US" smtClean="0"/>
               <a:pPr/>
-              <a:t>4/2/2019</a:t>
+              <a:t>5/8/2019</a:t>
             </a:fld>
             <a:endParaRPr lang="en-IN"/>
           </a:p>
@@ -6675,7 +6675,7 @@
     </p:spTree>
     <p:extLst>
       <p:ext uri="{BB962C8B-B14F-4D97-AF65-F5344CB8AC3E}">
-        <p14:creationId xmlns="" xmlns:p14="http://schemas.microsoft.com/office/powerpoint/2010/main" val="3774589174"/>
+        <p14:creationId xmlns:p14="http://schemas.microsoft.com/office/powerpoint/2010/main" xmlns="" val="3774589174"/>
       </p:ext>
     </p:extLst>
   </p:cSld>
@@ -6882,7 +6882,7 @@
             <a:fld id="{25DDA433-6589-46AD-8D05-9E1E5CD5C5AC}" type="datetimeFigureOut">
               <a:rPr lang="en-US" smtClean="0"/>
               <a:pPr/>
-              <a:t>4/2/2019</a:t>
+              <a:t>5/8/2019</a:t>
             </a:fld>
             <a:endParaRPr lang="en-IN"/>
           </a:p>
@@ -6934,7 +6934,7 @@
     </p:spTree>
     <p:extLst>
       <p:ext uri="{BB962C8B-B14F-4D97-AF65-F5344CB8AC3E}">
-        <p14:creationId xmlns="" xmlns:p14="http://schemas.microsoft.com/office/powerpoint/2010/main" val="2499597931"/>
+        <p14:creationId xmlns:p14="http://schemas.microsoft.com/office/powerpoint/2010/main" xmlns="" val="2499597931"/>
       </p:ext>
     </p:extLst>
   </p:cSld>
@@ -7103,7 +7103,7 @@
             <a:fld id="{25DDA433-6589-46AD-8D05-9E1E5CD5C5AC}" type="datetimeFigureOut">
               <a:rPr lang="en-US" smtClean="0"/>
               <a:pPr/>
-              <a:t>4/2/2019</a:t>
+              <a:t>5/8/2019</a:t>
             </a:fld>
             <a:endParaRPr lang="en-IN"/>
           </a:p>
@@ -7191,7 +7191,7 @@
     </p:spTree>
     <p:extLst>
       <p:ext uri="{BB962C8B-B14F-4D97-AF65-F5344CB8AC3E}">
-        <p14:creationId xmlns="" xmlns:p14="http://schemas.microsoft.com/office/powerpoint/2010/main" val="629933824"/>
+        <p14:creationId xmlns:p14="http://schemas.microsoft.com/office/powerpoint/2010/main" xmlns="" val="629933824"/>
       </p:ext>
     </p:extLst>
   </p:cSld>
@@ -7623,7 +7623,7 @@
             <a:fld id="{DD2A2399-3C9C-6B45-A20A-3D6766199C84}" type="datetimeFigureOut">
               <a:rPr lang="en-US" smtClean="0"/>
               <a:pPr/>
-              <a:t>4/2/2019</a:t>
+              <a:t>5/8/2019</a:t>
             </a:fld>
             <a:endParaRPr lang="en-US"/>
           </a:p>
@@ -7711,7 +7711,7 @@
     </p:spTree>
     <p:extLst>
       <p:ext uri="{BB962C8B-B14F-4D97-AF65-F5344CB8AC3E}">
-        <p14:creationId xmlns="" xmlns:p14="http://schemas.microsoft.com/office/powerpoint/2010/main" val="2051673148"/>
+        <p14:creationId xmlns:p14="http://schemas.microsoft.com/office/powerpoint/2010/main" xmlns="" val="2051673148"/>
       </p:ext>
     </p:extLst>
   </p:cSld>
@@ -9065,8 +9065,8 @@
         </p:nvSpPr>
         <p:spPr>
           <a:xfrm>
-            <a:off x="571472" y="714356"/>
-            <a:ext cx="7772400" cy="1470025"/>
+            <a:off x="571472" y="714357"/>
+            <a:ext cx="7772400" cy="1071570"/>
           </a:xfrm>
         </p:spPr>
         <p:txBody>
@@ -9100,7 +9100,7 @@
         </p:nvSpPr>
         <p:spPr>
           <a:xfrm>
-            <a:off x="571472" y="2285992"/>
+            <a:off x="571472" y="1714488"/>
             <a:ext cx="7643866" cy="1752600"/>
           </a:xfrm>
         </p:spPr>
@@ -9125,6 +9125,262 @@
                 <a:schemeClr val="tx1"/>
               </a:solidFill>
               <a:latin typeface="Calibri" pitchFamily="34" charset="0"/>
+            </a:endParaRPr>
+          </a:p>
+        </p:txBody>
+      </p:sp>
+      <p:sp>
+        <p:nvSpPr>
+          <p:cNvPr id="4" name="Title 1"/>
+          <p:cNvSpPr txBox="1">
+            <a:spLocks/>
+          </p:cNvSpPr>
+          <p:nvPr/>
+        </p:nvSpPr>
+        <p:spPr>
+          <a:xfrm>
+            <a:off x="500034" y="2500306"/>
+            <a:ext cx="7772400" cy="1470025"/>
+          </a:xfrm>
+          <a:prstGeom prst="rect">
+            <a:avLst/>
+          </a:prstGeom>
+        </p:spPr>
+        <p:txBody>
+          <a:bodyPr vert="horz" lIns="91440" tIns="45720" rIns="91440" bIns="45720" rtlCol="0" anchor="ctr">
+            <a:normAutofit/>
+          </a:bodyPr>
+          <a:lstStyle/>
+          <a:p>
+            <a:pPr marL="0" marR="0" lvl="0" indent="0" algn="l" defTabSz="457200" rtl="0" eaLnBrk="1" fontAlgn="auto" latinLnBrk="0" hangingPunct="1">
+              <a:lnSpc>
+                <a:spcPct val="100000"/>
+              </a:lnSpc>
+              <a:spcBef>
+                <a:spcPct val="0"/>
+              </a:spcBef>
+              <a:spcAft>
+                <a:spcPts val="0"/>
+              </a:spcAft>
+              <a:buClrTx/>
+              <a:buSzTx/>
+              <a:buFontTx/>
+              <a:buNone/>
+              <a:tabLst/>
+              <a:defRPr/>
+            </a:pPr>
+            <a:r>
+              <a:rPr kumimoji="0" lang="en-IN" sz="4800" b="1" i="0" u="none" strike="noStrike" kern="1200" cap="none" spc="0" normalizeH="0" baseline="0" noProof="0" dirty="0" smtClean="0">
+                <a:ln>
+                  <a:noFill/>
+                </a:ln>
+                <a:solidFill>
+                  <a:schemeClr val="tx1"/>
+                </a:solidFill>
+                <a:effectLst/>
+                <a:uLnTx/>
+                <a:uFillTx/>
+                <a:latin typeface="Calibri" pitchFamily="34" charset="0"/>
+                <a:ea typeface="+mj-ea"/>
+                <a:cs typeface="Helvetica"/>
+              </a:rPr>
+              <a:t>Motivation	</a:t>
+            </a:r>
+            <a:endParaRPr kumimoji="0" lang="en-IN" sz="4800" b="1" i="0" u="none" strike="noStrike" kern="1200" cap="none" spc="0" normalizeH="0" baseline="0" noProof="0" dirty="0">
+              <a:ln>
+                <a:noFill/>
+              </a:ln>
+              <a:solidFill>
+                <a:schemeClr val="tx1"/>
+              </a:solidFill>
+              <a:effectLst/>
+              <a:uLnTx/>
+              <a:uFillTx/>
+              <a:latin typeface="Calibri" pitchFamily="34" charset="0"/>
+              <a:ea typeface="+mj-ea"/>
+              <a:cs typeface="Helvetica"/>
+            </a:endParaRPr>
+          </a:p>
+        </p:txBody>
+      </p:sp>
+      <p:sp>
+        <p:nvSpPr>
+          <p:cNvPr id="5" name="Subtitle 2"/>
+          <p:cNvSpPr txBox="1">
+            <a:spLocks/>
+          </p:cNvSpPr>
+          <p:nvPr/>
+        </p:nvSpPr>
+        <p:spPr>
+          <a:xfrm>
+            <a:off x="500034" y="3929066"/>
+            <a:ext cx="7572428" cy="2000264"/>
+          </a:xfrm>
+          <a:prstGeom prst="rect">
+            <a:avLst/>
+          </a:prstGeom>
+        </p:spPr>
+        <p:txBody>
+          <a:bodyPr vert="horz" lIns="91440" tIns="45720" rIns="91440" bIns="45720" rtlCol="0">
+            <a:normAutofit/>
+          </a:bodyPr>
+          <a:lstStyle/>
+          <a:p>
+            <a:pPr marL="457200" marR="0" lvl="0" indent="-457200" algn="l" defTabSz="457200" rtl="0" eaLnBrk="1" fontAlgn="auto" latinLnBrk="0" hangingPunct="1">
+              <a:lnSpc>
+                <a:spcPct val="100000"/>
+              </a:lnSpc>
+              <a:spcBef>
+                <a:spcPct val="20000"/>
+              </a:spcBef>
+              <a:spcAft>
+                <a:spcPts val="0"/>
+              </a:spcAft>
+              <a:buClrTx/>
+              <a:buSzTx/>
+              <a:buFont typeface="Arial"/>
+              <a:buNone/>
+              <a:tabLst/>
+              <a:defRPr/>
+            </a:pPr>
+            <a:r>
+              <a:rPr kumimoji="0" lang="en-IN" sz="2000" b="0" i="0" u="none" strike="noStrike" kern="1200" cap="none" spc="0" normalizeH="0" baseline="0" noProof="0" smtClean="0">
+                <a:ln>
+                  <a:noFill/>
+                </a:ln>
+                <a:solidFill>
+                  <a:schemeClr val="tx1"/>
+                </a:solidFill>
+                <a:effectLst/>
+                <a:uLnTx/>
+                <a:uFillTx/>
+                <a:latin typeface="Calibri" pitchFamily="34" charset="0"/>
+                <a:ea typeface="+mn-ea"/>
+                <a:cs typeface="Helvetica"/>
+              </a:rPr>
+              <a:t>A data analysis and visualization graph helps to</a:t>
+            </a:r>
+          </a:p>
+          <a:p>
+            <a:pPr marL="457200" marR="0" lvl="0" indent="-457200" algn="l" defTabSz="457200" rtl="0" eaLnBrk="1" fontAlgn="auto" latinLnBrk="0" hangingPunct="1">
+              <a:lnSpc>
+                <a:spcPct val="100000"/>
+              </a:lnSpc>
+              <a:spcBef>
+                <a:spcPct val="20000"/>
+              </a:spcBef>
+              <a:spcAft>
+                <a:spcPts val="0"/>
+              </a:spcAft>
+              <a:buClrTx/>
+              <a:buSzTx/>
+              <a:buFont typeface="+mj-lt"/>
+              <a:buAutoNum type="arabicPeriod"/>
+              <a:tabLst/>
+              <a:defRPr/>
+            </a:pPr>
+            <a:r>
+              <a:rPr kumimoji="0" lang="en-IN" sz="2000" b="0" i="0" u="none" strike="noStrike" kern="1200" cap="none" spc="0" normalizeH="0" baseline="0" noProof="0" smtClean="0">
+                <a:ln>
+                  <a:noFill/>
+                </a:ln>
+                <a:solidFill>
+                  <a:schemeClr val="tx1"/>
+                </a:solidFill>
+                <a:effectLst/>
+                <a:uLnTx/>
+                <a:uFillTx/>
+                <a:latin typeface="Calibri" pitchFamily="34" charset="0"/>
+                <a:ea typeface="+mn-ea"/>
+                <a:cs typeface="Helvetica"/>
+              </a:rPr>
+              <a:t>Knowing about asteroids and understanding the data.</a:t>
+            </a:r>
+          </a:p>
+          <a:p>
+            <a:pPr marL="457200" marR="0" lvl="0" indent="-457200" algn="l" defTabSz="457200" rtl="0" eaLnBrk="1" fontAlgn="auto" latinLnBrk="0" hangingPunct="1">
+              <a:lnSpc>
+                <a:spcPct val="100000"/>
+              </a:lnSpc>
+              <a:spcBef>
+                <a:spcPct val="20000"/>
+              </a:spcBef>
+              <a:spcAft>
+                <a:spcPts val="0"/>
+              </a:spcAft>
+              <a:buClrTx/>
+              <a:buSzTx/>
+              <a:buFont typeface="+mj-lt"/>
+              <a:buAutoNum type="arabicPeriod"/>
+              <a:tabLst/>
+              <a:defRPr/>
+            </a:pPr>
+            <a:r>
+              <a:rPr kumimoji="0" lang="en-IN" sz="2000" b="0" i="0" u="none" strike="noStrike" kern="1200" cap="none" spc="0" normalizeH="0" baseline="0" noProof="0" smtClean="0">
+                <a:ln>
+                  <a:noFill/>
+                </a:ln>
+                <a:solidFill>
+                  <a:schemeClr val="tx1"/>
+                </a:solidFill>
+                <a:effectLst/>
+                <a:uLnTx/>
+                <a:uFillTx/>
+                <a:latin typeface="Calibri" pitchFamily="34" charset="0"/>
+                <a:ea typeface="+mn-ea"/>
+                <a:cs typeface="Helvetica"/>
+              </a:rPr>
+              <a:t>Predict the impact of future object based on their size and velocity.</a:t>
+            </a:r>
+          </a:p>
+          <a:p>
+            <a:pPr marL="457200" marR="0" lvl="0" indent="-457200" algn="l" defTabSz="457200" rtl="0" eaLnBrk="1" fontAlgn="auto" latinLnBrk="0" hangingPunct="1">
+              <a:lnSpc>
+                <a:spcPct val="100000"/>
+              </a:lnSpc>
+              <a:spcBef>
+                <a:spcPct val="20000"/>
+              </a:spcBef>
+              <a:spcAft>
+                <a:spcPts val="0"/>
+              </a:spcAft>
+              <a:buClrTx/>
+              <a:buSzTx/>
+              <a:buFont typeface="+mj-lt"/>
+              <a:buAutoNum type="arabicPeriod"/>
+              <a:tabLst/>
+              <a:defRPr/>
+            </a:pPr>
+            <a:r>
+              <a:rPr kumimoji="0" lang="en-IN" sz="2000" b="0" i="0" u="none" strike="noStrike" kern="1200" cap="none" spc="0" normalizeH="0" baseline="0" noProof="0" smtClean="0">
+                <a:ln>
+                  <a:noFill/>
+                </a:ln>
+                <a:solidFill>
+                  <a:schemeClr val="tx1"/>
+                </a:solidFill>
+                <a:effectLst/>
+                <a:uLnTx/>
+                <a:uFillTx/>
+                <a:latin typeface="Calibri" pitchFamily="34" charset="0"/>
+                <a:ea typeface="+mn-ea"/>
+                <a:cs typeface="Helvetica"/>
+              </a:rPr>
+              <a:t>Figuring out interesting facts by comparing the data provided by NASA</a:t>
+            </a:r>
+            <a:endParaRPr kumimoji="0" lang="en-IN" sz="2000" b="0" i="0" u="none" strike="noStrike" kern="1200" cap="none" spc="0" normalizeH="0" baseline="0" noProof="0" dirty="0" smtClean="0">
+              <a:ln>
+                <a:noFill/>
+              </a:ln>
+              <a:solidFill>
+                <a:schemeClr val="tx1"/>
+              </a:solidFill>
+              <a:effectLst/>
+              <a:uLnTx/>
+              <a:uFillTx/>
+              <a:latin typeface="Calibri" pitchFamily="34" charset="0"/>
+              <a:ea typeface="+mn-ea"/>
+              <a:cs typeface="Helvetica"/>
             </a:endParaRPr>
           </a:p>
         </p:txBody>
@@ -9163,7 +9419,7 @@
       </p:grpSpPr>
       <p:sp>
         <p:nvSpPr>
-          <p:cNvPr id="2" name="Title 1"/>
+          <p:cNvPr id="4" name="Title 3"/>
           <p:cNvSpPr>
             <a:spLocks noGrp="1"/>
           </p:cNvSpPr>
@@ -9171,34 +9427,18 @@
             <p:ph type="ctrTitle"/>
           </p:nvPr>
         </p:nvSpPr>
-        <p:spPr>
-          <a:xfrm>
-            <a:off x="571472" y="714356"/>
-            <a:ext cx="7772400" cy="1470025"/>
-          </a:xfrm>
-        </p:spPr>
-        <p:txBody>
-          <a:bodyPr>
-            <a:normAutofit/>
-          </a:bodyPr>
-          <a:lstStyle/>
-          <a:p>
-            <a:pPr algn="l"/>
-            <a:r>
-              <a:rPr lang="en-IN" sz="4800" b="1" dirty="0" smtClean="0">
-                <a:latin typeface="Calibri" pitchFamily="34" charset="0"/>
-              </a:rPr>
-              <a:t>Motivation	</a:t>
-            </a:r>
-            <a:endParaRPr lang="en-IN" sz="4800" b="1" dirty="0">
-              <a:latin typeface="Calibri" pitchFamily="34" charset="0"/>
-            </a:endParaRPr>
-          </a:p>
-        </p:txBody>
-      </p:sp>
-      <p:sp>
-        <p:nvSpPr>
-          <p:cNvPr id="3" name="Subtitle 2"/>
+        <p:spPr/>
+        <p:txBody>
+          <a:bodyPr/>
+          <a:lstStyle/>
+          <a:p>
+            <a:endParaRPr lang="en-IN"/>
+          </a:p>
+        </p:txBody>
+      </p:sp>
+      <p:sp>
+        <p:nvSpPr>
+          <p:cNvPr id="5" name="Subtitle 4"/>
           <p:cNvSpPr>
             <a:spLocks noGrp="1"/>
           </p:cNvSpPr>
@@ -9206,99 +9446,12 @@
             <p:ph type="subTitle" idx="1"/>
           </p:nvPr>
         </p:nvSpPr>
-        <p:spPr>
-          <a:xfrm>
-            <a:off x="571472" y="2285992"/>
-            <a:ext cx="7572428" cy="2000264"/>
-          </a:xfrm>
-        </p:spPr>
-        <p:txBody>
-          <a:bodyPr>
-            <a:normAutofit/>
-          </a:bodyPr>
-          <a:lstStyle/>
-          <a:p>
-            <a:pPr marL="457200" indent="-457200" algn="l"/>
-            <a:r>
-              <a:rPr lang="en-IN" sz="2000" dirty="0" smtClean="0">
-                <a:solidFill>
-                  <a:schemeClr val="tx1"/>
-                </a:solidFill>
-                <a:latin typeface="Calibri" pitchFamily="34" charset="0"/>
-              </a:rPr>
-              <a:t>A data analysis and visualization graph helps to</a:t>
-            </a:r>
-          </a:p>
-          <a:p>
-            <a:pPr marL="457200" indent="-457200" algn="l">
-              <a:buFont typeface="+mj-lt"/>
-              <a:buAutoNum type="arabicPeriod"/>
-            </a:pPr>
-            <a:r>
-              <a:rPr lang="en-IN" sz="2000" dirty="0" smtClean="0">
-                <a:solidFill>
-                  <a:schemeClr val="tx1"/>
-                </a:solidFill>
-                <a:latin typeface="Calibri" pitchFamily="34" charset="0"/>
-              </a:rPr>
-              <a:t>Find out data patterns</a:t>
-            </a:r>
-          </a:p>
-          <a:p>
-            <a:pPr marL="457200" indent="-457200" algn="l">
-              <a:buFont typeface="+mj-lt"/>
-              <a:buAutoNum type="arabicPeriod"/>
-            </a:pPr>
-            <a:r>
-              <a:rPr lang="en-IN" sz="2000" dirty="0" smtClean="0">
-                <a:solidFill>
-                  <a:schemeClr val="tx1"/>
-                </a:solidFill>
-                <a:latin typeface="Calibri" pitchFamily="34" charset="0"/>
-              </a:rPr>
-              <a:t>Predict the impact of future object based on their size and velocity.</a:t>
-            </a:r>
-          </a:p>
-          <a:p>
-            <a:pPr marL="457200" indent="-457200" algn="l">
-              <a:buFont typeface="+mj-lt"/>
-              <a:buAutoNum type="arabicPeriod"/>
-            </a:pPr>
-            <a:r>
-              <a:rPr lang="en-IN" sz="2000" dirty="0" smtClean="0">
-                <a:solidFill>
-                  <a:schemeClr val="tx1"/>
-                </a:solidFill>
-                <a:latin typeface="Calibri" pitchFamily="34" charset="0"/>
-              </a:rPr>
-              <a:t>Can understand the data properly</a:t>
-            </a:r>
-          </a:p>
-          <a:p>
-            <a:pPr marL="457200" indent="-457200" algn="l">
-              <a:buFont typeface="+mj-lt"/>
-              <a:buAutoNum type="arabicPeriod"/>
-            </a:pPr>
-            <a:r>
-              <a:rPr lang="en-IN" sz="2000" dirty="0" smtClean="0">
-                <a:solidFill>
-                  <a:schemeClr val="tx1"/>
-                </a:solidFill>
-                <a:latin typeface="Calibri" pitchFamily="34" charset="0"/>
-              </a:rPr>
-              <a:t>Figure data outliers</a:t>
-            </a:r>
-          </a:p>
-          <a:p>
-            <a:pPr marL="457200" indent="-457200" algn="l">
-              <a:buAutoNum type="arabicParenR"/>
-            </a:pPr>
-            <a:endParaRPr lang="en-IN" sz="2000" dirty="0">
-              <a:solidFill>
-                <a:schemeClr val="tx1"/>
-              </a:solidFill>
-              <a:latin typeface="Calibri" pitchFamily="34" charset="0"/>
-            </a:endParaRPr>
+        <p:spPr/>
+        <p:txBody>
+          <a:bodyPr/>
+          <a:lstStyle/>
+          <a:p>
+            <a:endParaRPr lang="en-IN"/>
           </a:p>
         </p:txBody>
       </p:sp>
@@ -9336,76 +9489,6 @@
       </p:grpSpPr>
       <p:sp>
         <p:nvSpPr>
-          <p:cNvPr id="2" name="Title 1"/>
-          <p:cNvSpPr>
-            <a:spLocks noGrp="1"/>
-          </p:cNvSpPr>
-          <p:nvPr>
-            <p:ph type="ctrTitle"/>
-          </p:nvPr>
-        </p:nvSpPr>
-        <p:spPr>
-          <a:xfrm>
-            <a:off x="500034" y="3286124"/>
-            <a:ext cx="7772400" cy="1470025"/>
-          </a:xfrm>
-        </p:spPr>
-        <p:txBody>
-          <a:bodyPr>
-            <a:normAutofit/>
-          </a:bodyPr>
-          <a:lstStyle/>
-          <a:p>
-            <a:pPr algn="l"/>
-            <a:r>
-              <a:rPr lang="en-IN" sz="4000" b="1" dirty="0" smtClean="0">
-                <a:latin typeface="Calibri" pitchFamily="34" charset="0"/>
-              </a:rPr>
-              <a:t>Type of project:</a:t>
-            </a:r>
-            <a:endParaRPr lang="en-IN" sz="4000" b="1" dirty="0">
-              <a:latin typeface="Calibri" pitchFamily="34" charset="0"/>
-            </a:endParaRPr>
-          </a:p>
-        </p:txBody>
-      </p:sp>
-      <p:sp>
-        <p:nvSpPr>
-          <p:cNvPr id="3" name="Subtitle 2"/>
-          <p:cNvSpPr>
-            <a:spLocks noGrp="1"/>
-          </p:cNvSpPr>
-          <p:nvPr>
-            <p:ph type="subTitle" idx="1"/>
-          </p:nvPr>
-        </p:nvSpPr>
-        <p:spPr>
-          <a:xfrm>
-            <a:off x="1000100" y="4500570"/>
-            <a:ext cx="7000924" cy="1752600"/>
-          </a:xfrm>
-        </p:spPr>
-        <p:txBody>
-          <a:bodyPr>
-            <a:normAutofit/>
-          </a:bodyPr>
-          <a:lstStyle/>
-          <a:p>
-            <a:pPr algn="l"/>
-            <a:r>
-              <a:rPr lang="en-IN" sz="2000" dirty="0" smtClean="0">
-                <a:solidFill>
-                  <a:schemeClr val="tx1"/>
-                </a:solidFill>
-                <a:latin typeface="Calibri" pitchFamily="34" charset="0"/>
-              </a:rPr>
-              <a:t>Visualization and development</a:t>
-            </a:r>
-          </a:p>
-        </p:txBody>
-      </p:sp>
-      <p:sp>
-        <p:nvSpPr>
           <p:cNvPr id="4" name="Title 1"/>
           <p:cNvSpPr txBox="1">
             <a:spLocks/>
@@ -9544,7 +9627,7 @@
         <p:spPr>
           <a:xfrm>
             <a:off x="642910" y="1785926"/>
-            <a:ext cx="6286544" cy="1477328"/>
+            <a:ext cx="6286544" cy="1323439"/>
           </a:xfrm>
           <a:prstGeom prst="rect">
             <a:avLst/>
@@ -9558,45 +9641,45 @@
           <a:lstStyle/>
           <a:p>
             <a:r>
-              <a:rPr lang="en-IN" dirty="0" smtClean="0"/>
-              <a:t>Real time data (dynamic) using NASA NEO API </a:t>
-            </a:r>
-          </a:p>
-          <a:p>
-            <a:r>
-              <a:rPr lang="en-IN" dirty="0" smtClean="0"/>
-              <a:t>Angular 7 for creating web pages.</a:t>
-            </a:r>
-          </a:p>
-          <a:p>
-            <a:r>
-              <a:rPr lang="en-IN" dirty="0" smtClean="0"/>
-              <a:t>Open source visualization tools.</a:t>
-            </a:r>
-          </a:p>
-          <a:p>
-            <a:r>
-              <a:rPr lang="en-IN" dirty="0" err="1" smtClean="0"/>
-              <a:t>Github</a:t>
-            </a:r>
-            <a:r>
-              <a:rPr lang="en-IN" dirty="0" smtClean="0"/>
-              <a:t> for tracking source code</a:t>
-            </a:r>
-          </a:p>
-          <a:p>
-            <a:r>
-              <a:rPr lang="en-IN" dirty="0" smtClean="0"/>
-              <a:t>Python and </a:t>
-            </a:r>
-            <a:r>
-              <a:rPr lang="en-IN" dirty="0" err="1" smtClean="0"/>
-              <a:t>pycharm</a:t>
-            </a:r>
-            <a:r>
-              <a:rPr lang="en-IN" dirty="0" smtClean="0"/>
-              <a:t> for developing models</a:t>
-            </a:r>
+              <a:rPr lang="en-IN" sz="2000" dirty="0" smtClean="0"/>
+              <a:t>Angular </a:t>
+            </a:r>
+          </a:p>
+          <a:p>
+            <a:r>
+              <a:rPr lang="en-IN" sz="2000" dirty="0" smtClean="0"/>
+              <a:t>Python (pandas, </a:t>
+            </a:r>
+            <a:r>
+              <a:rPr lang="en-IN" sz="2000" dirty="0" err="1" smtClean="0"/>
+              <a:t>numpy</a:t>
+            </a:r>
+            <a:r>
+              <a:rPr lang="en-IN" sz="2000" dirty="0" smtClean="0"/>
+              <a:t>, </a:t>
+            </a:r>
+            <a:r>
+              <a:rPr lang="en-IN" sz="2000" dirty="0" err="1" smtClean="0"/>
+              <a:t>matplotlib</a:t>
+            </a:r>
+            <a:r>
+              <a:rPr lang="en-IN" sz="2000" dirty="0" smtClean="0"/>
+              <a:t>)</a:t>
+            </a:r>
+          </a:p>
+          <a:p>
+            <a:r>
+              <a:rPr lang="en-IN" sz="2000" dirty="0" err="1" smtClean="0"/>
+              <a:t>H</a:t>
+            </a:r>
+            <a:r>
+              <a:rPr lang="en-IN" sz="2000" dirty="0" err="1" smtClean="0"/>
+              <a:t>eroku</a:t>
+            </a:r>
+            <a:endParaRPr lang="en-IN" sz="2000" dirty="0" smtClean="0"/>
+          </a:p>
+          <a:p>
+            <a:endParaRPr lang="en-IN" sz="2000" dirty="0" smtClean="0"/>
           </a:p>
         </p:txBody>
       </p:sp>

</xml_diff>